<commit_message>
sample bar graph for race project
</commit_message>
<xml_diff>
--- a/ERAS_Linguistics/ERAS_sex_report-v1.pptx
+++ b/ERAS_Linguistics/ERAS_sex_report-v1.pptx
@@ -234,7 +234,7 @@
           <a:p>
             <a:fld id="{BCDE9BE5-1E5C-40BC-8B8B-138879D63244}" type="datetimeFigureOut">
               <a:rPr lang="en-US" smtClean="0"/>
-              <a:t>2/8/2022</a:t>
+              <a:t>3/30/2022</a:t>
             </a:fld>
             <a:endParaRPr lang="en-US"/>
           </a:p>
@@ -1896,36 +1896,6 @@
                 <a:spcPts val="0"/>
               </a:spcBef>
             </a:pPr>
-            <a:endParaRPr lang="en-US" sz="1800" dirty="0">
-              <a:solidFill>
-                <a:srgbClr val="232629"/>
-              </a:solidFill>
-              <a:effectLst/>
-              <a:latin typeface="Segoe UI" panose="020B0502040204020203" pitchFamily="34" charset="0"/>
-              <a:ea typeface="Times New Roman" panose="02020603050405020304" pitchFamily="18" charset="0"/>
-            </a:endParaRPr>
-          </a:p>
-          <a:p>
-            <a:pPr marL="0" marR="0" fontAlgn="base">
-              <a:spcBef>
-                <a:spcPts val="0"/>
-              </a:spcBef>
-            </a:pPr>
-            <a:endParaRPr lang="en-US" sz="1800" dirty="0">
-              <a:solidFill>
-                <a:srgbClr val="232629"/>
-              </a:solidFill>
-              <a:effectLst/>
-              <a:latin typeface="Segoe UI" panose="020B0502040204020203" pitchFamily="34" charset="0"/>
-              <a:ea typeface="Times New Roman" panose="02020603050405020304" pitchFamily="18" charset="0"/>
-            </a:endParaRPr>
-          </a:p>
-          <a:p>
-            <a:pPr marL="0" marR="0" fontAlgn="base">
-              <a:spcBef>
-                <a:spcPts val="0"/>
-              </a:spcBef>
-            </a:pPr>
             <a:r>
               <a:rPr lang="en-US" sz="1800" dirty="0">
                 <a:solidFill>
@@ -2805,7 +2775,7 @@
           <a:p>
             <a:fld id="{3FADF09A-9CE9-4645-B226-E7AAD1D0AFC8}" type="datetimeFigureOut">
               <a:rPr lang="en-US" smtClean="0"/>
-              <a:t>2/8/2022</a:t>
+              <a:t>3/30/2022</a:t>
             </a:fld>
             <a:endParaRPr lang="en-US"/>
           </a:p>
@@ -3003,7 +2973,7 @@
           <a:p>
             <a:fld id="{3FADF09A-9CE9-4645-B226-E7AAD1D0AFC8}" type="datetimeFigureOut">
               <a:rPr lang="en-US" smtClean="0"/>
-              <a:t>2/8/2022</a:t>
+              <a:t>3/30/2022</a:t>
             </a:fld>
             <a:endParaRPr lang="en-US"/>
           </a:p>
@@ -3211,7 +3181,7 @@
           <a:p>
             <a:fld id="{3FADF09A-9CE9-4645-B226-E7AAD1D0AFC8}" type="datetimeFigureOut">
               <a:rPr lang="en-US" smtClean="0"/>
-              <a:t>2/8/2022</a:t>
+              <a:t>3/30/2022</a:t>
             </a:fld>
             <a:endParaRPr lang="en-US"/>
           </a:p>
@@ -3409,7 +3379,7 @@
           <a:p>
             <a:fld id="{3FADF09A-9CE9-4645-B226-E7AAD1D0AFC8}" type="datetimeFigureOut">
               <a:rPr lang="en-US" smtClean="0"/>
-              <a:t>2/8/2022</a:t>
+              <a:t>3/30/2022</a:t>
             </a:fld>
             <a:endParaRPr lang="en-US"/>
           </a:p>
@@ -3684,7 +3654,7 @@
           <a:p>
             <a:fld id="{3FADF09A-9CE9-4645-B226-E7AAD1D0AFC8}" type="datetimeFigureOut">
               <a:rPr lang="en-US" smtClean="0"/>
-              <a:t>2/8/2022</a:t>
+              <a:t>3/30/2022</a:t>
             </a:fld>
             <a:endParaRPr lang="en-US"/>
           </a:p>
@@ -3949,7 +3919,7 @@
           <a:p>
             <a:fld id="{3FADF09A-9CE9-4645-B226-E7AAD1D0AFC8}" type="datetimeFigureOut">
               <a:rPr lang="en-US" smtClean="0"/>
-              <a:t>2/8/2022</a:t>
+              <a:t>3/30/2022</a:t>
             </a:fld>
             <a:endParaRPr lang="en-US"/>
           </a:p>
@@ -4361,7 +4331,7 @@
           <a:p>
             <a:fld id="{3FADF09A-9CE9-4645-B226-E7AAD1D0AFC8}" type="datetimeFigureOut">
               <a:rPr lang="en-US" smtClean="0"/>
-              <a:t>2/8/2022</a:t>
+              <a:t>3/30/2022</a:t>
             </a:fld>
             <a:endParaRPr lang="en-US"/>
           </a:p>
@@ -4502,7 +4472,7 @@
           <a:p>
             <a:fld id="{3FADF09A-9CE9-4645-B226-E7AAD1D0AFC8}" type="datetimeFigureOut">
               <a:rPr lang="en-US" smtClean="0"/>
-              <a:t>2/8/2022</a:t>
+              <a:t>3/30/2022</a:t>
             </a:fld>
             <a:endParaRPr lang="en-US"/>
           </a:p>
@@ -4615,7 +4585,7 @@
           <a:p>
             <a:fld id="{3FADF09A-9CE9-4645-B226-E7AAD1D0AFC8}" type="datetimeFigureOut">
               <a:rPr lang="en-US" smtClean="0"/>
-              <a:t>2/8/2022</a:t>
+              <a:t>3/30/2022</a:t>
             </a:fld>
             <a:endParaRPr lang="en-US"/>
           </a:p>
@@ -4926,7 +4896,7 @@
           <a:p>
             <a:fld id="{3FADF09A-9CE9-4645-B226-E7AAD1D0AFC8}" type="datetimeFigureOut">
               <a:rPr lang="en-US" smtClean="0"/>
-              <a:t>2/8/2022</a:t>
+              <a:t>3/30/2022</a:t>
             </a:fld>
             <a:endParaRPr lang="en-US"/>
           </a:p>
@@ -5214,7 +5184,7 @@
           <a:p>
             <a:fld id="{3FADF09A-9CE9-4645-B226-E7AAD1D0AFC8}" type="datetimeFigureOut">
               <a:rPr lang="en-US" smtClean="0"/>
-              <a:t>2/8/2022</a:t>
+              <a:t>3/30/2022</a:t>
             </a:fld>
             <a:endParaRPr lang="en-US"/>
           </a:p>
@@ -5455,7 +5425,7 @@
           <a:p>
             <a:fld id="{3FADF09A-9CE9-4645-B226-E7AAD1D0AFC8}" type="datetimeFigureOut">
               <a:rPr lang="en-US" smtClean="0"/>
-              <a:t>2/8/2022</a:t>
+              <a:t>3/30/2022</a:t>
             </a:fld>
             <a:endParaRPr lang="en-US"/>
           </a:p>

</xml_diff>